<commit_message>
re-initialise with non-time distortion version
</commit_message>
<xml_diff>
--- a/src/SE2/Stimuli/Instructions_Rewarded.pptx
+++ b/src/SE2/Stimuli/Instructions_Rewarded.pptx
@@ -204,7 +204,7 @@
           <a:p>
             <a:fld id="{62CC9F90-0A1B-4ABF-970D-CD45F3EE6569}" type="datetimeFigureOut">
               <a:rPr lang="fr-FR" smtClean="0"/>
-              <a:t>18/03/2022</a:t>
+              <a:t>27/02/2022</a:t>
             </a:fld>
             <a:endParaRPr lang="fr-FR"/>
           </a:p>
@@ -362,7 +362,7 @@
           <a:p>
             <a:fld id="{E8BC793C-F542-422D-B0F4-20EA999D0B3F}" type="slidenum">
               <a:rPr lang="fr-FR" smtClean="0"/>
-              <a:t>‹N°›</a:t>
+              <a:t>‹#›</a:t>
             </a:fld>
             <a:endParaRPr lang="fr-FR"/>
           </a:p>
@@ -705,7 +705,7 @@
           <a:p>
             <a:fld id="{53BABFD8-D892-4D56-AE10-021BD01BA1FF}" type="datetimeFigureOut">
               <a:rPr lang="fr-FR" smtClean="0"/>
-              <a:t>18/03/2022</a:t>
+              <a:t>27/02/2022</a:t>
             </a:fld>
             <a:endParaRPr lang="fr-FR"/>
           </a:p>
@@ -759,7 +759,7 @@
           <a:p>
             <a:fld id="{0AB29355-503D-4F95-9DE8-1F3DA58A7EA4}" type="slidenum">
               <a:rPr lang="fr-FR" smtClean="0"/>
-              <a:t>‹N°›</a:t>
+              <a:t>‹#›</a:t>
             </a:fld>
             <a:endParaRPr lang="fr-FR"/>
           </a:p>
@@ -903,7 +903,7 @@
           <a:p>
             <a:fld id="{53BABFD8-D892-4D56-AE10-021BD01BA1FF}" type="datetimeFigureOut">
               <a:rPr lang="fr-FR" smtClean="0"/>
-              <a:t>18/03/2022</a:t>
+              <a:t>27/02/2022</a:t>
             </a:fld>
             <a:endParaRPr lang="fr-FR"/>
           </a:p>
@@ -957,7 +957,7 @@
           <a:p>
             <a:fld id="{0AB29355-503D-4F95-9DE8-1F3DA58A7EA4}" type="slidenum">
               <a:rPr lang="fr-FR" smtClean="0"/>
-              <a:t>‹N°›</a:t>
+              <a:t>‹#›</a:t>
             </a:fld>
             <a:endParaRPr lang="fr-FR"/>
           </a:p>
@@ -1111,7 +1111,7 @@
           <a:p>
             <a:fld id="{53BABFD8-D892-4D56-AE10-021BD01BA1FF}" type="datetimeFigureOut">
               <a:rPr lang="fr-FR" smtClean="0"/>
-              <a:t>18/03/2022</a:t>
+              <a:t>27/02/2022</a:t>
             </a:fld>
             <a:endParaRPr lang="fr-FR"/>
           </a:p>
@@ -1165,7 +1165,7 @@
           <a:p>
             <a:fld id="{0AB29355-503D-4F95-9DE8-1F3DA58A7EA4}" type="slidenum">
               <a:rPr lang="fr-FR" smtClean="0"/>
-              <a:t>‹N°›</a:t>
+              <a:t>‹#›</a:t>
             </a:fld>
             <a:endParaRPr lang="fr-FR"/>
           </a:p>
@@ -1309,7 +1309,7 @@
           <a:p>
             <a:fld id="{53BABFD8-D892-4D56-AE10-021BD01BA1FF}" type="datetimeFigureOut">
               <a:rPr lang="fr-FR" smtClean="0"/>
-              <a:t>18/03/2022</a:t>
+              <a:t>27/02/2022</a:t>
             </a:fld>
             <a:endParaRPr lang="fr-FR"/>
           </a:p>
@@ -1363,7 +1363,7 @@
           <a:p>
             <a:fld id="{0AB29355-503D-4F95-9DE8-1F3DA58A7EA4}" type="slidenum">
               <a:rPr lang="fr-FR" smtClean="0"/>
-              <a:t>‹N°›</a:t>
+              <a:t>‹#›</a:t>
             </a:fld>
             <a:endParaRPr lang="fr-FR"/>
           </a:p>
@@ -1584,7 +1584,7 @@
           <a:p>
             <a:fld id="{53BABFD8-D892-4D56-AE10-021BD01BA1FF}" type="datetimeFigureOut">
               <a:rPr lang="fr-FR" smtClean="0"/>
-              <a:t>18/03/2022</a:t>
+              <a:t>27/02/2022</a:t>
             </a:fld>
             <a:endParaRPr lang="fr-FR"/>
           </a:p>
@@ -1638,7 +1638,7 @@
           <a:p>
             <a:fld id="{0AB29355-503D-4F95-9DE8-1F3DA58A7EA4}" type="slidenum">
               <a:rPr lang="fr-FR" smtClean="0"/>
-              <a:t>‹N°›</a:t>
+              <a:t>‹#›</a:t>
             </a:fld>
             <a:endParaRPr lang="fr-FR"/>
           </a:p>
@@ -1849,7 +1849,7 @@
           <a:p>
             <a:fld id="{53BABFD8-D892-4D56-AE10-021BD01BA1FF}" type="datetimeFigureOut">
               <a:rPr lang="fr-FR" smtClean="0"/>
-              <a:t>18/03/2022</a:t>
+              <a:t>27/02/2022</a:t>
             </a:fld>
             <a:endParaRPr lang="fr-FR"/>
           </a:p>
@@ -1903,7 +1903,7 @@
           <a:p>
             <a:fld id="{0AB29355-503D-4F95-9DE8-1F3DA58A7EA4}" type="slidenum">
               <a:rPr lang="fr-FR" smtClean="0"/>
-              <a:t>‹N°›</a:t>
+              <a:t>‹#›</a:t>
             </a:fld>
             <a:endParaRPr lang="fr-FR"/>
           </a:p>
@@ -2261,7 +2261,7 @@
           <a:p>
             <a:fld id="{53BABFD8-D892-4D56-AE10-021BD01BA1FF}" type="datetimeFigureOut">
               <a:rPr lang="fr-FR" smtClean="0"/>
-              <a:t>18/03/2022</a:t>
+              <a:t>27/02/2022</a:t>
             </a:fld>
             <a:endParaRPr lang="fr-FR"/>
           </a:p>
@@ -2315,7 +2315,7 @@
           <a:p>
             <a:fld id="{0AB29355-503D-4F95-9DE8-1F3DA58A7EA4}" type="slidenum">
               <a:rPr lang="fr-FR" smtClean="0"/>
-              <a:t>‹N°›</a:t>
+              <a:t>‹#›</a:t>
             </a:fld>
             <a:endParaRPr lang="fr-FR"/>
           </a:p>
@@ -2402,7 +2402,7 @@
           <a:p>
             <a:fld id="{53BABFD8-D892-4D56-AE10-021BD01BA1FF}" type="datetimeFigureOut">
               <a:rPr lang="fr-FR" smtClean="0"/>
-              <a:t>18/03/2022</a:t>
+              <a:t>27/02/2022</a:t>
             </a:fld>
             <a:endParaRPr lang="fr-FR"/>
           </a:p>
@@ -2456,7 +2456,7 @@
           <a:p>
             <a:fld id="{0AB29355-503D-4F95-9DE8-1F3DA58A7EA4}" type="slidenum">
               <a:rPr lang="fr-FR" smtClean="0"/>
-              <a:t>‹N°›</a:t>
+              <a:t>‹#›</a:t>
             </a:fld>
             <a:endParaRPr lang="fr-FR"/>
           </a:p>
@@ -2515,7 +2515,7 @@
           <a:p>
             <a:fld id="{53BABFD8-D892-4D56-AE10-021BD01BA1FF}" type="datetimeFigureOut">
               <a:rPr lang="fr-FR" smtClean="0"/>
-              <a:t>18/03/2022</a:t>
+              <a:t>27/02/2022</a:t>
             </a:fld>
             <a:endParaRPr lang="fr-FR"/>
           </a:p>
@@ -2569,7 +2569,7 @@
           <a:p>
             <a:fld id="{0AB29355-503D-4F95-9DE8-1F3DA58A7EA4}" type="slidenum">
               <a:rPr lang="fr-FR" smtClean="0"/>
-              <a:t>‹N°›</a:t>
+              <a:t>‹#›</a:t>
             </a:fld>
             <a:endParaRPr lang="fr-FR"/>
           </a:p>
@@ -2826,7 +2826,7 @@
           <a:p>
             <a:fld id="{53BABFD8-D892-4D56-AE10-021BD01BA1FF}" type="datetimeFigureOut">
               <a:rPr lang="fr-FR" smtClean="0"/>
-              <a:t>18/03/2022</a:t>
+              <a:t>27/02/2022</a:t>
             </a:fld>
             <a:endParaRPr lang="fr-FR"/>
           </a:p>
@@ -2880,7 +2880,7 @@
           <a:p>
             <a:fld id="{0AB29355-503D-4F95-9DE8-1F3DA58A7EA4}" type="slidenum">
               <a:rPr lang="fr-FR" smtClean="0"/>
-              <a:t>‹N°›</a:t>
+              <a:t>‹#›</a:t>
             </a:fld>
             <a:endParaRPr lang="fr-FR"/>
           </a:p>
@@ -3114,7 +3114,7 @@
           <a:p>
             <a:fld id="{53BABFD8-D892-4D56-AE10-021BD01BA1FF}" type="datetimeFigureOut">
               <a:rPr lang="fr-FR" smtClean="0"/>
-              <a:t>18/03/2022</a:t>
+              <a:t>27/02/2022</a:t>
             </a:fld>
             <a:endParaRPr lang="fr-FR"/>
           </a:p>
@@ -3168,7 +3168,7 @@
           <a:p>
             <a:fld id="{0AB29355-503D-4F95-9DE8-1F3DA58A7EA4}" type="slidenum">
               <a:rPr lang="fr-FR" smtClean="0"/>
-              <a:t>‹N°›</a:t>
+              <a:t>‹#›</a:t>
             </a:fld>
             <a:endParaRPr lang="fr-FR"/>
           </a:p>
@@ -3355,7 +3355,7 @@
           <a:p>
             <a:fld id="{53BABFD8-D892-4D56-AE10-021BD01BA1FF}" type="datetimeFigureOut">
               <a:rPr lang="fr-FR" smtClean="0"/>
-              <a:t>18/03/2022</a:t>
+              <a:t>27/02/2022</a:t>
             </a:fld>
             <a:endParaRPr lang="fr-FR"/>
           </a:p>
@@ -3445,7 +3445,7 @@
           <a:p>
             <a:fld id="{0AB29355-503D-4F95-9DE8-1F3DA58A7EA4}" type="slidenum">
               <a:rPr lang="fr-FR" smtClean="0"/>
-              <a:t>‹N°›</a:t>
+              <a:t>‹#›</a:t>
             </a:fld>
             <a:endParaRPr lang="fr-FR"/>
           </a:p>
@@ -3933,7 +3933,7 @@
             <a:pPr lvl="1"/>
             <a:r>
               <a:rPr lang="fr-FR" dirty="0"/>
-              <a:t>Vous ferez 46 exercices de mémorisation, qui consisteront à mémoriser l’emplacement de paires de chiffres disposés sur une grille. Plus il y aura de paires de chiffres à mémoriser, plus l’exercice sera difficile.</a:t>
+              <a:t>Vous ferez 27 exercices de mémorisation, qui consisteront à mémoriser l’emplacement de paires de chiffres disposés sur une grille. Plus il y aura de paires de chiffres à mémoriser, plus l’exercice sera difficile.</a:t>
             </a:r>
           </a:p>
           <a:p>
@@ -4084,21 +4084,13 @@
             </a:r>
             <a:r>
               <a:rPr lang="fr-FR" dirty="0"/>
-              <a:t> est le nombre de points que vous obtenez si vous atteignez l’objectif (1 ou 10). Attention: votre rétribution financière dépend du total de points que vous aurez obtenu (sur les 46 exercices).</a:t>
+              <a:t> est le nombre de points que vous obtenez si vous atteignez l’objectif (1, 10 ou 100). Attention: votre rétribution financière dépend du total de points que vous aurez obtenu (sur les 27 exercices).</a:t>
             </a:r>
           </a:p>
           <a:p>
             <a:r>
               <a:rPr lang="fr-FR" dirty="0"/>
-              <a:t>Avant chaque exercice, nous vous afficherons l’objectif et le bonus. Vous nous indiquerez alors combien de temps vous souhaitez voir la grille (entre 15 et </a:t>
-            </a:r>
-            <a:r>
-              <a:rPr lang="fr-FR" dirty="0" smtClean="0"/>
-              <a:t>75 </a:t>
-            </a:r>
-            <a:r>
-              <a:rPr lang="fr-FR" dirty="0"/>
-              <a:t>secondes).</a:t>
+              <a:t>Avant chaque exercice, nous vous afficherons l’objectif et le bonus. Vous nous indiquerez alors combien de temps vous souhaitez voir la grille (entre 0 et 60 secondes).</a:t>
             </a:r>
           </a:p>
           <a:p>
@@ -4637,8 +4629,8 @@
                 <a:t>comprend</a:t>
               </a:r>
               <a:r>
-                <a:rPr lang="en-GB" sz="2400"/>
-                <a:t> 46 </a:t>
+                <a:rPr lang="en-GB" sz="2400" dirty="0"/>
+                <a:t> 27 </a:t>
               </a:r>
               <a:r>
                 <a:rPr lang="en-GB" sz="2400" dirty="0" err="1"/>
@@ -4745,9 +4737,10 @@
             <a:p>
               <a:pPr algn="ctr"/>
               <a:r>
-                <a:rPr lang="fr-FR" sz="2400" dirty="0"/>
+                <a:rPr lang="fr-FR" sz="2400"/>
                 <a:t>L'exercice d'entraînement est terminé.</a:t>
               </a:r>
+              <a:endParaRPr lang="fr-FR" sz="2400" dirty="0"/>
             </a:p>
           </p:txBody>
         </p:sp>

</xml_diff>